<commit_message>
Modified copy of master branch. Added views, UI elements(only fps counter atm), moved level objects to its own class, working on a class for creating objects better (with sfml shape accessible through object userdata), changed cleanup rules to match world size + buffer (1000px), added zoom-on-location and zoom-based scaled view translation. Probably other stuff. The days are blurring together. Send help.
</commit_message>
<xml_diff>
--- a/resources/Assignment 1 proposal.pptx
+++ b/resources/Assignment 1 proposal.pptx
@@ -114,7 +114,18 @@
   </p:defaultTextStyle>
   <p:extLst>
     <p:ext uri="{EFAFB233-063F-42B5-8137-9DF3F51BA10A}">
-      <p15:sldGuideLst xmlns:p15="http://schemas.microsoft.com/office/powerpoint/2012/main" xmlns=""/>
+      <p15:sldGuideLst xmlns:p15="http://schemas.microsoft.com/office/powerpoint/2012/main">
+        <p15:guide id="1" orient="horz" pos="2160">
+          <p15:clr>
+            <a:srgbClr val="A4A3A4"/>
+          </p15:clr>
+        </p15:guide>
+        <p15:guide id="2" pos="3840">
+          <p15:clr>
+            <a:srgbClr val="A4A3A4"/>
+          </p15:clr>
+        </p15:guide>
+      </p15:sldGuideLst>
     </p:ext>
   </p:extLst>
 </p:presentation>
@@ -12482,12 +12493,6 @@
             </a:r>
           </a:p>
           <a:p>
-            <a:r>
-              <a:rPr lang="en-NZ" dirty="0"/>
-              <a:t>Game 1: Mini golf</a:t>
-            </a:r>
-          </a:p>
-          <a:p>
             <a:pPr lvl="1"/>
             <a:r>
               <a:rPr lang="en-NZ" dirty="0"/>
@@ -12568,10 +12573,9 @@
           <a:lstStyle/>
           <a:p>
             <a:r>
-              <a:rPr lang="en-NZ" dirty="0" smtClean="0"/>
+              <a:rPr lang="en-NZ" dirty="0"/>
               <a:t>Level Designer</a:t>
             </a:r>
-            <a:endParaRPr lang="en-NZ" dirty="0"/>
           </a:p>
         </p:txBody>
       </p:sp>
@@ -12596,36 +12600,35 @@
           <a:lstStyle/>
           <a:p>
             <a:r>
-              <a:rPr lang="en-NZ" dirty="0" smtClean="0"/>
+              <a:rPr lang="en-NZ" dirty="0"/>
               <a:t>Need to save a lot of the box2D object data such as textures, friction, restitution, position, etc. in a simple format that can be parsed into the program to save/load levels</a:t>
             </a:r>
           </a:p>
           <a:p>
             <a:r>
-              <a:rPr lang="en-NZ" dirty="0" smtClean="0"/>
+              <a:rPr lang="en-NZ" dirty="0"/>
               <a:t>Proposed using XML and a parser such as </a:t>
             </a:r>
             <a:r>
-              <a:rPr lang="en-NZ" dirty="0" err="1" smtClean="0"/>
+              <a:rPr lang="en-NZ" dirty="0" err="1"/>
               <a:t>pugixml</a:t>
             </a:r>
             <a:r>
-              <a:rPr lang="en-NZ" dirty="0" smtClean="0"/>
+              <a:rPr lang="en-NZ" dirty="0"/>
               <a:t> to perform this</a:t>
             </a:r>
           </a:p>
           <a:p>
             <a:r>
-              <a:rPr lang="en-NZ" dirty="0" smtClean="0"/>
+              <a:rPr lang="en-NZ" dirty="0"/>
               <a:t>Helps with scalability and can allow a lot to be done on a simple engine once a general game format is created</a:t>
             </a:r>
           </a:p>
           <a:p>
             <a:r>
-              <a:rPr lang="en-NZ" dirty="0" smtClean="0"/>
+              <a:rPr lang="en-NZ" dirty="0"/>
               <a:t>Can be used for the following games (next slide); will likely implement Game1 first using the designer, and maybe game2 if there’s time</a:t>
             </a:r>
-            <a:endParaRPr lang="en-NZ" dirty="0"/>
           </a:p>
         </p:txBody>
       </p:sp>
@@ -12718,6 +12721,67 @@
           </a:p>
         </p:txBody>
       </p:sp>
+      <p:pic>
+        <p:nvPicPr>
+          <p:cNvPr id="6" name="Picture 5"/>
+          <p:cNvPicPr/>
+          <p:nvPr/>
+        </p:nvPicPr>
+        <p:blipFill>
+          <a:blip r:embed="rId2"/>
+          <a:stretch>
+            <a:fillRect/>
+          </a:stretch>
+        </p:blipFill>
+        <p:spPr>
+          <a:xfrm>
+            <a:off x="6948653" y="3932571"/>
+            <a:ext cx="3916045" cy="2936875"/>
+          </a:xfrm>
+          <a:prstGeom prst="rect">
+            <a:avLst/>
+          </a:prstGeom>
+        </p:spPr>
+      </p:pic>
+      <p:pic>
+        <p:nvPicPr>
+          <p:cNvPr id="7" name="Picture 6" descr="https://lh3.googleusercontent.com/xzcBJFpLf3AEEYhdiydJ957v1zGpQH0oGrhAApu4sKpXO6wUsgZAxjK52JLJdLRCZg=h310"/>
+          <p:cNvPicPr/>
+          <p:nvPr/>
+        </p:nvPicPr>
+        <p:blipFill>
+          <a:blip r:embed="rId3">
+            <a:extLst>
+              <a:ext uri="{28A0092B-C50C-407E-A947-70E740481C1C}">
+                <a14:useLocalDpi xmlns:a14="http://schemas.microsoft.com/office/drawing/2010/main" val="0"/>
+              </a:ext>
+            </a:extLst>
+          </a:blip>
+          <a:srcRect/>
+          <a:stretch>
+            <a:fillRect/>
+          </a:stretch>
+        </p:blipFill>
+        <p:spPr bwMode="auto">
+          <a:xfrm>
+            <a:off x="1141412" y="3905250"/>
+            <a:ext cx="5248275" cy="2952750"/>
+          </a:xfrm>
+          <a:prstGeom prst="rect">
+            <a:avLst/>
+          </a:prstGeom>
+          <a:noFill/>
+          <a:extLst>
+            <a:ext uri="{909E8E84-426E-40DD-AFC4-6F175D3DCCD1}">
+              <a14:hiddenFill xmlns:a14="http://schemas.microsoft.com/office/drawing/2010/main">
+                <a:solidFill>
+                  <a:srgbClr val="FFFFFF"/>
+                </a:solidFill>
+              </a14:hiddenFill>
+            </a:ext>
+          </a:extLst>
+        </p:spPr>
+      </p:pic>
     </p:spTree>
     <p:extLst>
       <p:ext uri="{BB962C8B-B14F-4D97-AF65-F5344CB8AC3E}">
@@ -12765,13 +12829,8 @@
           <a:p>
             <a:r>
               <a:rPr lang="en-NZ" dirty="0"/>
-              <a:t>Game </a:t>
-            </a:r>
-            <a:r>
-              <a:rPr lang="en-NZ" dirty="0" smtClean="0"/>
-              <a:t>2 Zombie Onslaught</a:t>
-            </a:r>
-            <a:endParaRPr lang="en-NZ" dirty="0"/>
+              <a:t>Game 2 Zombie Onslaught</a:t>
+            </a:r>
           </a:p>
         </p:txBody>
       </p:sp>
@@ -13069,6 +13128,12 @@
               <a:t>Capabilities: Experience in SFML from last semester, basic knowledge of AI</a:t>
             </a:r>
           </a:p>
+          <a:p>
+            <a:r>
+              <a:rPr lang="en-NZ" dirty="0"/>
+              <a:t>More focus on algorithms than the design side of things</a:t>
+            </a:r>
+          </a:p>
         </p:txBody>
       </p:sp>
     </p:spTree>
@@ -13249,10 +13314,9 @@
           <a:lstStyle/>
           <a:p>
             <a:r>
-              <a:rPr lang="en-NZ" dirty="0" smtClean="0"/>
+              <a:rPr lang="en-NZ" dirty="0"/>
               <a:t>Questions / Comments?</a:t>
             </a:r>
-            <a:endParaRPr lang="en-NZ" dirty="0"/>
           </a:p>
         </p:txBody>
       </p:sp>
@@ -13533,7 +13597,7 @@
   <a:extraClrSchemeLst/>
   <a:extLst>
     <a:ext uri="{05A4C25C-085E-4340-85A3-A5531E510DB2}">
-      <thm15:themeFamily xmlns:thm15="http://schemas.microsoft.com/office/thememl/2012/main" xmlns="" name="Circuit" id="{0AC2F7E7-15F5-431C-B2A2-456FE929F56C}" vid="{142578CA-DEC9-49C3-80AF-C113973CC9A9}"/>
+      <thm15:themeFamily xmlns:thm15="http://schemas.microsoft.com/office/thememl/2012/main" name="Circuit" id="{0AC2F7E7-15F5-431C-B2A2-456FE929F56C}" vid="{142578CA-DEC9-49C3-80AF-C113973CC9A9}"/>
     </a:ext>
   </a:extLst>
 </a:theme>

</xml_diff>